<commit_message>
ds added, code updated, output added, ppt updated, abstract completed, notes added
</commit_message>
<xml_diff>
--- a/Project ppt.pptx
+++ b/Project ppt.pptx
@@ -8,6 +8,10 @@
     <p:sldId id="256" r:id="rId2"/>
     <p:sldId id="258" r:id="rId3"/>
     <p:sldId id="259" r:id="rId4"/>
+    <p:sldId id="260" r:id="rId5"/>
+    <p:sldId id="261" r:id="rId6"/>
+    <p:sldId id="262" r:id="rId7"/>
+    <p:sldId id="263" r:id="rId8"/>
   </p:sldIdLst>
   <p:sldSz cx="9144000" cy="6858000" type="screen4x3"/>
   <p:notesSz cx="6858000" cy="9144000"/>
@@ -4604,8 +4608,8 @@
         </p:nvSpPr>
         <p:spPr>
           <a:xfrm>
-            <a:off x="685800" y="692697"/>
-            <a:ext cx="7486600" cy="2889666"/>
+            <a:off x="251520" y="1052736"/>
+            <a:ext cx="8640960" cy="2169587"/>
           </a:xfrm>
         </p:spPr>
         <p:txBody>
@@ -4616,16 +4620,22 @@
           <a:p>
             <a:pPr algn="just"/>
             <a:r>
-              <a:rPr lang="en-IN" sz="4400" dirty="0" smtClean="0"/>
-              <a:t>Exploring </a:t>
-            </a:r>
-            <a:r>
-              <a:rPr lang="en-IN" sz="4400" dirty="0" err="1" smtClean="0"/>
-              <a:t>dimentionality</a:t>
-            </a:r>
-            <a:r>
-              <a:rPr lang="en-IN" sz="4400" dirty="0" smtClean="0"/>
-              <a:t> reduction techniques for text-clustering using Indic Languages</a:t>
+              <a:rPr lang="en-US" sz="4400" dirty="0">
+                <a:effectLst/>
+              </a:rPr>
+              <a:t>Feature Reduction Techniques for </a:t>
+            </a:r>
+            <a:r>
+              <a:rPr lang="en-US" sz="4400" dirty="0" smtClean="0">
+                <a:effectLst/>
+              </a:rPr>
+              <a:t>Indic Script </a:t>
+            </a:r>
+            <a:r>
+              <a:rPr lang="en-US" sz="4400" dirty="0">
+                <a:effectLst/>
+              </a:rPr>
+              <a:t>Text Clustering</a:t>
             </a:r>
             <a:endParaRPr lang="en-IN" sz="4400" dirty="0"/>
           </a:p>
@@ -4872,7 +4882,12 @@
             <p:ph idx="1"/>
           </p:nvPr>
         </p:nvSpPr>
-        <p:spPr/>
+        <p:spPr>
+          <a:xfrm>
+            <a:off x="457200" y="1481329"/>
+            <a:ext cx="8229600" cy="1515624"/>
+          </a:xfrm>
+        </p:spPr>
         <p:txBody>
           <a:bodyPr/>
           <a:lstStyle/>
@@ -4935,6 +4950,495 @@
       </p:par>
     </p:tnLst>
   </p:timing>
+</p:sld>
+</file>
+
+<file path=ppt/slides/slide4.xml><?xml version="1.0" encoding="utf-8"?>
+<p:sld xmlns:a="http://schemas.openxmlformats.org/drawingml/2006/main" xmlns:r="http://schemas.openxmlformats.org/officeDocument/2006/relationships" xmlns:p="http://schemas.openxmlformats.org/presentationml/2006/main">
+  <p:cSld>
+    <p:spTree>
+      <p:nvGrpSpPr>
+        <p:cNvPr id="1" name=""/>
+        <p:cNvGrpSpPr/>
+        <p:nvPr/>
+      </p:nvGrpSpPr>
+      <p:grpSpPr>
+        <a:xfrm>
+          <a:off x="0" y="0"/>
+          <a:ext cx="0" cy="0"/>
+          <a:chOff x="0" y="0"/>
+          <a:chExt cx="0" cy="0"/>
+        </a:xfrm>
+      </p:grpSpPr>
+      <p:sp>
+        <p:nvSpPr>
+          <p:cNvPr id="2" name="Content Placeholder 1"/>
+          <p:cNvSpPr>
+            <a:spLocks noGrp="1"/>
+          </p:cNvSpPr>
+          <p:nvPr>
+            <p:ph idx="1"/>
+          </p:nvPr>
+        </p:nvSpPr>
+        <p:spPr>
+          <a:xfrm>
+            <a:off x="457200" y="1481329"/>
+            <a:ext cx="8229600" cy="2307712"/>
+          </a:xfrm>
+        </p:spPr>
+        <p:txBody>
+          <a:bodyPr/>
+          <a:lstStyle/>
+          <a:p>
+            <a:r>
+              <a:rPr lang="en-US" b="1" dirty="0" smtClean="0"/>
+              <a:t>Document </a:t>
+            </a:r>
+            <a:r>
+              <a:rPr lang="en-US" b="1" dirty="0"/>
+              <a:t>representation</a:t>
+            </a:r>
+            <a:r>
+              <a:rPr lang="en-US" dirty="0"/>
+              <a:t> is concerned about how textual </a:t>
+            </a:r>
+            <a:r>
+              <a:rPr lang="en-US" b="1" dirty="0"/>
+              <a:t>document</a:t>
+            </a:r>
+            <a:r>
+              <a:rPr lang="en-US" dirty="0"/>
+              <a:t>s should be represented in various tasks, </a:t>
+            </a:r>
+            <a:endParaRPr lang="en-US" dirty="0" smtClean="0"/>
+          </a:p>
+          <a:p>
+            <a:r>
+              <a:rPr lang="en-US" dirty="0" smtClean="0"/>
+              <a:t>Its </a:t>
+            </a:r>
+            <a:r>
+              <a:rPr lang="en-US" dirty="0"/>
+              <a:t>prevailing approach is the vector space </a:t>
+            </a:r>
+            <a:r>
+              <a:rPr lang="en-US" dirty="0" smtClean="0"/>
+              <a:t>model. Ex: TF-IDF</a:t>
+            </a:r>
+          </a:p>
+        </p:txBody>
+      </p:sp>
+      <p:sp>
+        <p:nvSpPr>
+          <p:cNvPr id="3" name="Title 2"/>
+          <p:cNvSpPr>
+            <a:spLocks noGrp="1"/>
+          </p:cNvSpPr>
+          <p:nvPr>
+            <p:ph type="title"/>
+          </p:nvPr>
+        </p:nvSpPr>
+        <p:spPr/>
+        <p:txBody>
+          <a:bodyPr/>
+          <a:lstStyle/>
+          <a:p>
+            <a:r>
+              <a:rPr lang="en-IN" dirty="0" smtClean="0"/>
+              <a:t>Document representation</a:t>
+            </a:r>
+            <a:endParaRPr lang="en-IN" dirty="0"/>
+          </a:p>
+        </p:txBody>
+      </p:sp>
+    </p:spTree>
+    <p:extLst>
+      <p:ext uri="{BB962C8B-B14F-4D97-AF65-F5344CB8AC3E}">
+        <p14:creationId xmlns:p14="http://schemas.microsoft.com/office/powerpoint/2010/main" val="213707526"/>
+      </p:ext>
+    </p:extLst>
+  </p:cSld>
+  <p:clrMapOvr>
+    <a:masterClrMapping/>
+  </p:clrMapOvr>
+  <p:timing>
+    <p:tnLst>
+      <p:par>
+        <p:cTn id="1" dur="indefinite" restart="never" nodeType="tmRoot"/>
+      </p:par>
+    </p:tnLst>
+  </p:timing>
+</p:sld>
+</file>
+
+<file path=ppt/slides/slide5.xml><?xml version="1.0" encoding="utf-8"?>
+<p:sld xmlns:a="http://schemas.openxmlformats.org/drawingml/2006/main" xmlns:r="http://schemas.openxmlformats.org/officeDocument/2006/relationships" xmlns:p="http://schemas.openxmlformats.org/presentationml/2006/main">
+  <p:cSld>
+    <p:spTree>
+      <p:nvGrpSpPr>
+        <p:cNvPr id="1" name=""/>
+        <p:cNvGrpSpPr/>
+        <p:nvPr/>
+      </p:nvGrpSpPr>
+      <p:grpSpPr>
+        <a:xfrm>
+          <a:off x="0" y="0"/>
+          <a:ext cx="0" cy="0"/>
+          <a:chOff x="0" y="0"/>
+          <a:chExt cx="0" cy="0"/>
+        </a:xfrm>
+      </p:grpSpPr>
+      <p:sp>
+        <p:nvSpPr>
+          <p:cNvPr id="2" name="Content Placeholder 1"/>
+          <p:cNvSpPr>
+            <a:spLocks noGrp="1"/>
+          </p:cNvSpPr>
+          <p:nvPr>
+            <p:ph idx="1"/>
+          </p:nvPr>
+        </p:nvSpPr>
+        <p:spPr>
+          <a:xfrm>
+            <a:off x="457200" y="1481328"/>
+            <a:ext cx="8363272" cy="4525963"/>
+          </a:xfrm>
+        </p:spPr>
+        <p:txBody>
+          <a:bodyPr/>
+          <a:lstStyle/>
+          <a:p>
+            <a:r>
+              <a:rPr lang="en-US" dirty="0" err="1"/>
+              <a:t>Tf-idf</a:t>
+            </a:r>
+            <a:r>
+              <a:rPr lang="en-US" dirty="0"/>
+              <a:t> stands for term frequency-inverse document </a:t>
+            </a:r>
+            <a:r>
+              <a:rPr lang="en-US" dirty="0" smtClean="0"/>
+              <a:t>frequency.</a:t>
+            </a:r>
+          </a:p>
+          <a:p>
+            <a:r>
+              <a:rPr lang="en-US" dirty="0"/>
+              <a:t>TF(t) = (Number of times term t appears in a document) / (Total number of terms in the document</a:t>
+            </a:r>
+            <a:r>
+              <a:rPr lang="en-US" dirty="0" smtClean="0"/>
+              <a:t>).</a:t>
+            </a:r>
+          </a:p>
+          <a:p>
+            <a:r>
+              <a:rPr lang="en-US" dirty="0"/>
+              <a:t>IDF(t) = </a:t>
+            </a:r>
+            <a:r>
+              <a:rPr lang="en-US" dirty="0" smtClean="0"/>
+              <a:t>log</a:t>
+            </a:r>
+            <a:r>
+              <a:rPr lang="en-US" sz="1400" dirty="0" smtClean="0"/>
+              <a:t>e</a:t>
+            </a:r>
+            <a:r>
+              <a:rPr lang="en-US" dirty="0" smtClean="0"/>
+              <a:t>(Total </a:t>
+            </a:r>
+            <a:r>
+              <a:rPr lang="en-US" dirty="0"/>
+              <a:t>number of documents / Number of documents with term t in it</a:t>
+            </a:r>
+            <a:r>
+              <a:rPr lang="en-US" dirty="0" smtClean="0"/>
+              <a:t>).</a:t>
+            </a:r>
+          </a:p>
+          <a:p>
+            <a:r>
+              <a:rPr lang="en-US" dirty="0" smtClean="0"/>
+              <a:t>Python implementation:</a:t>
+            </a:r>
+            <a:r>
+              <a:rPr lang="en-IN" b="1" dirty="0">
+                <a:hlinkClick r:id="rId2" tooltip="sklearn.feature_extraction.text"/>
+              </a:rPr>
+              <a:t> </a:t>
+            </a:r>
+            <a:r>
+              <a:rPr lang="en-IN" b="1" dirty="0" err="1">
+                <a:hlinkClick r:id="rId2" tooltip="sklearn.feature_extraction.text"/>
+              </a:rPr>
+              <a:t>sklearn.feature_extraction.text</a:t>
+            </a:r>
+            <a:r>
+              <a:rPr lang="en-IN" b="1" dirty="0" err="1"/>
+              <a:t>.TfidfVectorizer</a:t>
+            </a:r>
+            <a:endParaRPr lang="en-IN" b="1" dirty="0"/>
+          </a:p>
+          <a:p>
+            <a:endParaRPr lang="en-US" dirty="0" smtClean="0"/>
+          </a:p>
+          <a:p>
+            <a:endParaRPr lang="en-IN" dirty="0"/>
+          </a:p>
+        </p:txBody>
+      </p:sp>
+      <p:sp>
+        <p:nvSpPr>
+          <p:cNvPr id="3" name="Title 2"/>
+          <p:cNvSpPr>
+            <a:spLocks noGrp="1"/>
+          </p:cNvSpPr>
+          <p:nvPr>
+            <p:ph type="title"/>
+          </p:nvPr>
+        </p:nvSpPr>
+        <p:spPr/>
+        <p:txBody>
+          <a:bodyPr/>
+          <a:lstStyle/>
+          <a:p>
+            <a:r>
+              <a:rPr lang="en-IN" dirty="0" smtClean="0"/>
+              <a:t>TF-IDF</a:t>
+            </a:r>
+            <a:endParaRPr lang="en-IN" dirty="0"/>
+          </a:p>
+        </p:txBody>
+      </p:sp>
+    </p:spTree>
+    <p:extLst>
+      <p:ext uri="{BB962C8B-B14F-4D97-AF65-F5344CB8AC3E}">
+        <p14:creationId xmlns:p14="http://schemas.microsoft.com/office/powerpoint/2010/main" val="1727426039"/>
+      </p:ext>
+    </p:extLst>
+  </p:cSld>
+  <p:clrMapOvr>
+    <a:masterClrMapping/>
+  </p:clrMapOvr>
+  <p:timing>
+    <p:tnLst>
+      <p:par>
+        <p:cTn id="1" dur="indefinite" restart="never" nodeType="tmRoot"/>
+      </p:par>
+    </p:tnLst>
+  </p:timing>
+</p:sld>
+</file>
+
+<file path=ppt/slides/slide6.xml><?xml version="1.0" encoding="utf-8"?>
+<p:sld xmlns:a="http://schemas.openxmlformats.org/drawingml/2006/main" xmlns:r="http://schemas.openxmlformats.org/officeDocument/2006/relationships" xmlns:p="http://schemas.openxmlformats.org/presentationml/2006/main">
+  <p:cSld>
+    <p:spTree>
+      <p:nvGrpSpPr>
+        <p:cNvPr id="1" name=""/>
+        <p:cNvGrpSpPr/>
+        <p:nvPr/>
+      </p:nvGrpSpPr>
+      <p:grpSpPr>
+        <a:xfrm>
+          <a:off x="0" y="0"/>
+          <a:ext cx="0" cy="0"/>
+          <a:chOff x="0" y="0"/>
+          <a:chExt cx="0" cy="0"/>
+        </a:xfrm>
+      </p:grpSpPr>
+      <p:sp>
+        <p:nvSpPr>
+          <p:cNvPr id="2" name="Content Placeholder 1"/>
+          <p:cNvSpPr>
+            <a:spLocks noGrp="1"/>
+          </p:cNvSpPr>
+          <p:nvPr>
+            <p:ph idx="1"/>
+          </p:nvPr>
+        </p:nvSpPr>
+        <p:spPr/>
+        <p:txBody>
+          <a:bodyPr/>
+          <a:lstStyle/>
+          <a:p>
+            <a:r>
+              <a:rPr lang="en-US" dirty="0" smtClean="0"/>
+              <a:t>Process </a:t>
+            </a:r>
+            <a:r>
+              <a:rPr lang="en-US" dirty="0"/>
+              <a:t>of dimensionality reduction by which an initial set of raw data is reduced to more manageable </a:t>
+            </a:r>
+            <a:r>
+              <a:rPr lang="en-US" dirty="0" smtClean="0"/>
+              <a:t>groups.</a:t>
+            </a:r>
+          </a:p>
+          <a:p>
+            <a:r>
+              <a:rPr lang="en-US" dirty="0" smtClean="0"/>
+              <a:t>Feature extraction techniques used in this project:</a:t>
+            </a:r>
+          </a:p>
+          <a:p>
+            <a:pPr marL="109728" indent="0">
+              <a:buNone/>
+            </a:pPr>
+            <a:r>
+              <a:rPr lang="en-IN" dirty="0" smtClean="0"/>
+              <a:t>	PCA, K-PCA, S-PCA, I-PCA, ICA, SVD, LDA</a:t>
+            </a:r>
+            <a:endParaRPr lang="en-IN" dirty="0"/>
+          </a:p>
+        </p:txBody>
+      </p:sp>
+      <p:sp>
+        <p:nvSpPr>
+          <p:cNvPr id="3" name="Title 2"/>
+          <p:cNvSpPr>
+            <a:spLocks noGrp="1"/>
+          </p:cNvSpPr>
+          <p:nvPr>
+            <p:ph type="title"/>
+          </p:nvPr>
+        </p:nvSpPr>
+        <p:spPr/>
+        <p:txBody>
+          <a:bodyPr/>
+          <a:lstStyle/>
+          <a:p>
+            <a:r>
+              <a:rPr lang="en-IN" dirty="0" smtClean="0"/>
+              <a:t>Feature Extraction</a:t>
+            </a:r>
+            <a:endParaRPr lang="en-IN" dirty="0"/>
+          </a:p>
+        </p:txBody>
+      </p:sp>
+    </p:spTree>
+    <p:extLst>
+      <p:ext uri="{BB962C8B-B14F-4D97-AF65-F5344CB8AC3E}">
+        <p14:creationId xmlns:p14="http://schemas.microsoft.com/office/powerpoint/2010/main" val="565018093"/>
+      </p:ext>
+    </p:extLst>
+  </p:cSld>
+  <p:clrMapOvr>
+    <a:masterClrMapping/>
+  </p:clrMapOvr>
+  <p:timing>
+    <p:tnLst>
+      <p:par>
+        <p:cTn id="1" dur="indefinite" restart="never" nodeType="tmRoot"/>
+      </p:par>
+    </p:tnLst>
+  </p:timing>
+</p:sld>
+</file>
+
+<file path=ppt/slides/slide7.xml><?xml version="1.0" encoding="utf-8"?>
+<p:sld xmlns:a="http://schemas.openxmlformats.org/drawingml/2006/main" xmlns:r="http://schemas.openxmlformats.org/officeDocument/2006/relationships" xmlns:p="http://schemas.openxmlformats.org/presentationml/2006/main">
+  <p:cSld>
+    <p:spTree>
+      <p:nvGrpSpPr>
+        <p:cNvPr id="1" name=""/>
+        <p:cNvGrpSpPr/>
+        <p:nvPr/>
+      </p:nvGrpSpPr>
+      <p:grpSpPr>
+        <a:xfrm>
+          <a:off x="0" y="0"/>
+          <a:ext cx="0" cy="0"/>
+          <a:chOff x="0" y="0"/>
+          <a:chExt cx="0" cy="0"/>
+        </a:xfrm>
+      </p:grpSpPr>
+      <p:sp>
+        <p:nvSpPr>
+          <p:cNvPr id="2" name="Content Placeholder 1"/>
+          <p:cNvSpPr>
+            <a:spLocks noGrp="1"/>
+          </p:cNvSpPr>
+          <p:nvPr>
+            <p:ph idx="1"/>
+          </p:nvPr>
+        </p:nvSpPr>
+        <p:spPr/>
+        <p:txBody>
+          <a:bodyPr/>
+          <a:lstStyle/>
+          <a:p>
+            <a:r>
+              <a:rPr lang="en-IN" dirty="0" smtClean="0"/>
+              <a:t>PCA is a statistical procedure that uses orthogonal transformation to convert a set of observations of </a:t>
+            </a:r>
+            <a:r>
+              <a:rPr lang="en-IN" dirty="0" err="1" smtClean="0"/>
+              <a:t>corelated</a:t>
+            </a:r>
+            <a:r>
+              <a:rPr lang="en-IN" dirty="0" smtClean="0"/>
+              <a:t> variables into a set of values of linearly uncorrelated variables called principal components.</a:t>
+            </a:r>
+          </a:p>
+          <a:p>
+            <a:r>
+              <a:rPr lang="en-IN" dirty="0" smtClean="0"/>
+              <a:t>Python implementation: </a:t>
+            </a:r>
+            <a:r>
+              <a:rPr lang="en-IN" b="1" dirty="0" err="1">
+                <a:hlinkClick r:id="rId2" tooltip="sklearn.decomposition"/>
+              </a:rPr>
+              <a:t>sklearn.decomposition</a:t>
+            </a:r>
+            <a:r>
+              <a:rPr lang="en-IN" b="1" dirty="0" err="1"/>
+              <a:t>.PCA</a:t>
+            </a:r>
+            <a:endParaRPr lang="en-IN" b="1"/>
+          </a:p>
+          <a:p>
+            <a:endParaRPr lang="en-IN" dirty="0"/>
+          </a:p>
+        </p:txBody>
+      </p:sp>
+      <p:sp>
+        <p:nvSpPr>
+          <p:cNvPr id="3" name="Title 2"/>
+          <p:cNvSpPr>
+            <a:spLocks noGrp="1"/>
+          </p:cNvSpPr>
+          <p:nvPr>
+            <p:ph type="title"/>
+          </p:nvPr>
+        </p:nvSpPr>
+        <p:spPr/>
+        <p:txBody>
+          <a:bodyPr>
+            <a:normAutofit/>
+          </a:bodyPr>
+          <a:lstStyle/>
+          <a:p>
+            <a:r>
+              <a:rPr lang="en-IN" dirty="0" smtClean="0"/>
+              <a:t>Principal Component Analysis</a:t>
+            </a:r>
+            <a:endParaRPr lang="en-IN" dirty="0"/>
+          </a:p>
+        </p:txBody>
+      </p:sp>
+    </p:spTree>
+    <p:extLst>
+      <p:ext uri="{BB962C8B-B14F-4D97-AF65-F5344CB8AC3E}">
+        <p14:creationId xmlns:p14="http://schemas.microsoft.com/office/powerpoint/2010/main" val="473158568"/>
+      </p:ext>
+    </p:extLst>
+  </p:cSld>
+  <p:clrMapOvr>
+    <a:masterClrMapping/>
+  </p:clrMapOvr>
 </p:sld>
 </file>
 

</xml_diff>

<commit_message>
added outputs from 5 clusters.
</commit_message>
<xml_diff>
--- a/Project ppt.pptx
+++ b/Project ppt.pptx
@@ -203,7 +203,7 @@
           <a:p>
             <a:fld id="{FF80D799-C9EE-456E-AAFF-270C931CDABE}" type="datetimeFigureOut">
               <a:rPr lang="en-IN" smtClean="0"/>
-              <a:t>01-12-2019</a:t>
+              <a:t>02-12-2019</a:t>
             </a:fld>
             <a:endParaRPr lang="en-IN"/>
           </a:p>
@@ -1180,7 +1180,7 @@
           <a:p>
             <a:fld id="{BDB42ABA-CE06-4504-8D5A-D6FD9543B87B}" type="datetimeFigureOut">
               <a:rPr lang="en-IN" smtClean="0"/>
-              <a:t>01-12-2019</a:t>
+              <a:t>02-12-2019</a:t>
             </a:fld>
             <a:endParaRPr lang="en-IN"/>
           </a:p>
@@ -1376,7 +1376,7 @@
           <a:p>
             <a:fld id="{BDB42ABA-CE06-4504-8D5A-D6FD9543B87B}" type="datetimeFigureOut">
               <a:rPr lang="en-IN" smtClean="0"/>
-              <a:t>01-12-2019</a:t>
+              <a:t>02-12-2019</a:t>
             </a:fld>
             <a:endParaRPr lang="en-IN"/>
           </a:p>
@@ -1561,7 +1561,7 @@
           <a:p>
             <a:fld id="{BDB42ABA-CE06-4504-8D5A-D6FD9543B87B}" type="datetimeFigureOut">
               <a:rPr lang="en-IN" smtClean="0"/>
-              <a:t>01-12-2019</a:t>
+              <a:t>02-12-2019</a:t>
             </a:fld>
             <a:endParaRPr lang="en-IN"/>
           </a:p>
@@ -1711,7 +1711,7 @@
           <a:p>
             <a:fld id="{BDB42ABA-CE06-4504-8D5A-D6FD9543B87B}" type="datetimeFigureOut">
               <a:rPr lang="en-IN" smtClean="0"/>
-              <a:t>01-12-2019</a:t>
+              <a:t>02-12-2019</a:t>
             </a:fld>
             <a:endParaRPr lang="en-IN"/>
           </a:p>
@@ -1966,7 +1966,7 @@
           <a:p>
             <a:fld id="{BDB42ABA-CE06-4504-8D5A-D6FD9543B87B}" type="datetimeFigureOut">
               <a:rPr lang="en-IN" smtClean="0"/>
-              <a:t>01-12-2019</a:t>
+              <a:t>02-12-2019</a:t>
             </a:fld>
             <a:endParaRPr lang="en-IN"/>
           </a:p>
@@ -2375,7 +2375,7 @@
           <a:p>
             <a:fld id="{BDB42ABA-CE06-4504-8D5A-D6FD9543B87B}" type="datetimeFigureOut">
               <a:rPr lang="en-IN" smtClean="0"/>
-              <a:t>01-12-2019</a:t>
+              <a:t>02-12-2019</a:t>
             </a:fld>
             <a:endParaRPr lang="en-IN"/>
           </a:p>
@@ -2821,7 +2821,7 @@
           <a:p>
             <a:fld id="{BDB42ABA-CE06-4504-8D5A-D6FD9543B87B}" type="datetimeFigureOut">
               <a:rPr lang="en-IN" smtClean="0"/>
-              <a:t>01-12-2019</a:t>
+              <a:t>02-12-2019</a:t>
             </a:fld>
             <a:endParaRPr lang="en-IN"/>
           </a:p>
@@ -2922,7 +2922,7 @@
           <a:p>
             <a:fld id="{BDB42ABA-CE06-4504-8D5A-D6FD9543B87B}" type="datetimeFigureOut">
               <a:rPr lang="en-IN" smtClean="0"/>
-              <a:t>01-12-2019</a:t>
+              <a:t>02-12-2019</a:t>
             </a:fld>
             <a:endParaRPr lang="en-IN"/>
           </a:p>
@@ -3043,7 +3043,7 @@
           <a:p>
             <a:fld id="{BDB42ABA-CE06-4504-8D5A-D6FD9543B87B}" type="datetimeFigureOut">
               <a:rPr lang="en-IN" smtClean="0"/>
-              <a:t>01-12-2019</a:t>
+              <a:t>02-12-2019</a:t>
             </a:fld>
             <a:endParaRPr lang="en-IN"/>
           </a:p>
@@ -3317,7 +3317,7 @@
           <a:p>
             <a:fld id="{BDB42ABA-CE06-4504-8D5A-D6FD9543B87B}" type="datetimeFigureOut">
               <a:rPr lang="en-IN" smtClean="0"/>
-              <a:t>01-12-2019</a:t>
+              <a:t>02-12-2019</a:t>
             </a:fld>
             <a:endParaRPr lang="en-IN"/>
           </a:p>
@@ -3522,7 +3522,7 @@
           <a:p>
             <a:fld id="{BDB42ABA-CE06-4504-8D5A-D6FD9543B87B}" type="datetimeFigureOut">
               <a:rPr lang="en-IN" smtClean="0"/>
-              <a:t>01-12-2019</a:t>
+              <a:t>02-12-2019</a:t>
             </a:fld>
             <a:endParaRPr lang="en-IN"/>
           </a:p>
@@ -4631,7 +4631,7 @@
           <a:p>
             <a:fld id="{BDB42ABA-CE06-4504-8D5A-D6FD9543B87B}" type="datetimeFigureOut">
               <a:rPr lang="en-IN" smtClean="0"/>
-              <a:t>01-12-2019</a:t>
+              <a:t>02-12-2019</a:t>
             </a:fld>
             <a:endParaRPr lang="en-IN"/>
           </a:p>
@@ -5343,7 +5343,6 @@
               <a:rPr lang="en-IN" dirty="0"/>
               <a:t> </a:t>
             </a:r>
-            <a:endParaRPr lang="en-IN" dirty="0"/>
           </a:p>
         </p:txBody>
       </p:sp>
@@ -5525,7 +5524,15 @@
             </a:pPr>
             <a:r>
               <a:rPr lang="en-IN" dirty="0" smtClean="0"/>
-              <a:t>Adjusted rank index.</a:t>
+              <a:t>Adjusted </a:t>
+            </a:r>
+            <a:r>
+              <a:rPr lang="en-IN" dirty="0" smtClean="0"/>
+              <a:t>rand </a:t>
+            </a:r>
+            <a:r>
+              <a:rPr lang="en-IN" dirty="0" smtClean="0"/>
+              <a:t>index.</a:t>
             </a:r>
           </a:p>
           <a:p>
@@ -5533,10 +5540,9 @@
               <a:buAutoNum type="arabicPeriod"/>
             </a:pPr>
             <a:r>
-              <a:rPr lang="en-IN" smtClean="0"/>
+              <a:rPr lang="en-IN" dirty="0" smtClean="0"/>
               <a:t>Completeness.</a:t>
             </a:r>
-            <a:endParaRPr lang="en-IN" dirty="0" smtClean="0"/>
           </a:p>
           <a:p>
             <a:pPr marL="624078" indent="-514350">
@@ -6239,15 +6245,7 @@
           <a:p>
             <a:r>
               <a:rPr lang="en-IN" dirty="0" smtClean="0"/>
-              <a:t>PCA is a statistical procedure that uses orthogonal transformation to convert a set of observations of </a:t>
-            </a:r>
-            <a:r>
-              <a:rPr lang="en-IN" dirty="0" smtClean="0"/>
-              <a:t>co-related </a:t>
-            </a:r>
-            <a:r>
-              <a:rPr lang="en-IN" dirty="0" smtClean="0"/>
-              <a:t>variables into a set of values of linearly uncorrelated variables called principal components.</a:t>
+              <a:t>PCA is a statistical procedure that uses orthogonal transformation to convert a set of observations of co-related variables into a set of values of linearly uncorrelated variables called principal components.</a:t>
             </a:r>
           </a:p>
           <a:p>
@@ -6562,7 +6560,6 @@
               <a:rPr lang="en-US" dirty="0"/>
               <a:t> priors encode the intuition that documents cover only a small set of topics and that topics use only a small set of words frequently. </a:t>
             </a:r>
-            <a:endParaRPr lang="en-US" dirty="0"/>
           </a:p>
           <a:p>
             <a:r>

</xml_diff>

<commit_message>
outputs and plots added
</commit_message>
<xml_diff>
--- a/Project ppt.pptx
+++ b/Project ppt.pptx
@@ -5,7 +5,7 @@
     <p:sldMasterId id="2147483660" r:id="rId1"/>
   </p:sldMasterIdLst>
   <p:notesMasterIdLst>
-    <p:notesMasterId r:id="rId14"/>
+    <p:notesMasterId r:id="rId13"/>
   </p:notesMasterIdLst>
   <p:sldIdLst>
     <p:sldId id="256" r:id="rId2"/>
@@ -16,10 +16,9 @@
     <p:sldId id="262" r:id="rId7"/>
     <p:sldId id="263" r:id="rId8"/>
     <p:sldId id="264" r:id="rId9"/>
-    <p:sldId id="265" r:id="rId10"/>
-    <p:sldId id="266" r:id="rId11"/>
-    <p:sldId id="268" r:id="rId12"/>
-    <p:sldId id="267" r:id="rId13"/>
+    <p:sldId id="266" r:id="rId10"/>
+    <p:sldId id="268" r:id="rId11"/>
+    <p:sldId id="267" r:id="rId12"/>
   </p:sldIdLst>
   <p:sldSz cx="9144000" cy="6858000" type="screen4x3"/>
   <p:notesSz cx="6858000" cy="9144000"/>
@@ -203,7 +202,7 @@
           <a:p>
             <a:fld id="{FF80D799-C9EE-456E-AAFF-270C931CDABE}" type="datetimeFigureOut">
               <a:rPr lang="en-IN" smtClean="0"/>
-              <a:t>02-12-2019</a:t>
+              <a:t>03-12-2019</a:t>
             </a:fld>
             <a:endParaRPr lang="en-IN"/>
           </a:p>
@@ -1180,7 +1179,7 @@
           <a:p>
             <a:fld id="{BDB42ABA-CE06-4504-8D5A-D6FD9543B87B}" type="datetimeFigureOut">
               <a:rPr lang="en-IN" smtClean="0"/>
-              <a:t>02-12-2019</a:t>
+              <a:t>03-12-2019</a:t>
             </a:fld>
             <a:endParaRPr lang="en-IN"/>
           </a:p>
@@ -1376,7 +1375,7 @@
           <a:p>
             <a:fld id="{BDB42ABA-CE06-4504-8D5A-D6FD9543B87B}" type="datetimeFigureOut">
               <a:rPr lang="en-IN" smtClean="0"/>
-              <a:t>02-12-2019</a:t>
+              <a:t>03-12-2019</a:t>
             </a:fld>
             <a:endParaRPr lang="en-IN"/>
           </a:p>
@@ -1561,7 +1560,7 @@
           <a:p>
             <a:fld id="{BDB42ABA-CE06-4504-8D5A-D6FD9543B87B}" type="datetimeFigureOut">
               <a:rPr lang="en-IN" smtClean="0"/>
-              <a:t>02-12-2019</a:t>
+              <a:t>03-12-2019</a:t>
             </a:fld>
             <a:endParaRPr lang="en-IN"/>
           </a:p>
@@ -1711,7 +1710,7 @@
           <a:p>
             <a:fld id="{BDB42ABA-CE06-4504-8D5A-D6FD9543B87B}" type="datetimeFigureOut">
               <a:rPr lang="en-IN" smtClean="0"/>
-              <a:t>02-12-2019</a:t>
+              <a:t>03-12-2019</a:t>
             </a:fld>
             <a:endParaRPr lang="en-IN"/>
           </a:p>
@@ -1966,7 +1965,7 @@
           <a:p>
             <a:fld id="{BDB42ABA-CE06-4504-8D5A-D6FD9543B87B}" type="datetimeFigureOut">
               <a:rPr lang="en-IN" smtClean="0"/>
-              <a:t>02-12-2019</a:t>
+              <a:t>03-12-2019</a:t>
             </a:fld>
             <a:endParaRPr lang="en-IN"/>
           </a:p>
@@ -2375,7 +2374,7 @@
           <a:p>
             <a:fld id="{BDB42ABA-CE06-4504-8D5A-D6FD9543B87B}" type="datetimeFigureOut">
               <a:rPr lang="en-IN" smtClean="0"/>
-              <a:t>02-12-2019</a:t>
+              <a:t>03-12-2019</a:t>
             </a:fld>
             <a:endParaRPr lang="en-IN"/>
           </a:p>
@@ -2821,7 +2820,7 @@
           <a:p>
             <a:fld id="{BDB42ABA-CE06-4504-8D5A-D6FD9543B87B}" type="datetimeFigureOut">
               <a:rPr lang="en-IN" smtClean="0"/>
-              <a:t>02-12-2019</a:t>
+              <a:t>03-12-2019</a:t>
             </a:fld>
             <a:endParaRPr lang="en-IN"/>
           </a:p>
@@ -2922,7 +2921,7 @@
           <a:p>
             <a:fld id="{BDB42ABA-CE06-4504-8D5A-D6FD9543B87B}" type="datetimeFigureOut">
               <a:rPr lang="en-IN" smtClean="0"/>
-              <a:t>02-12-2019</a:t>
+              <a:t>03-12-2019</a:t>
             </a:fld>
             <a:endParaRPr lang="en-IN"/>
           </a:p>
@@ -3043,7 +3042,7 @@
           <a:p>
             <a:fld id="{BDB42ABA-CE06-4504-8D5A-D6FD9543B87B}" type="datetimeFigureOut">
               <a:rPr lang="en-IN" smtClean="0"/>
-              <a:t>02-12-2019</a:t>
+              <a:t>03-12-2019</a:t>
             </a:fld>
             <a:endParaRPr lang="en-IN"/>
           </a:p>
@@ -3317,7 +3316,7 @@
           <a:p>
             <a:fld id="{BDB42ABA-CE06-4504-8D5A-D6FD9543B87B}" type="datetimeFigureOut">
               <a:rPr lang="en-IN" smtClean="0"/>
-              <a:t>02-12-2019</a:t>
+              <a:t>03-12-2019</a:t>
             </a:fld>
             <a:endParaRPr lang="en-IN"/>
           </a:p>
@@ -3522,7 +3521,7 @@
           <a:p>
             <a:fld id="{BDB42ABA-CE06-4504-8D5A-D6FD9543B87B}" type="datetimeFigureOut">
               <a:rPr lang="en-IN" smtClean="0"/>
-              <a:t>02-12-2019</a:t>
+              <a:t>03-12-2019</a:t>
             </a:fld>
             <a:endParaRPr lang="en-IN"/>
           </a:p>
@@ -4631,7 +4630,7 @@
           <a:p>
             <a:fld id="{BDB42ABA-CE06-4504-8D5A-D6FD9543B87B}" type="datetimeFigureOut">
               <a:rPr lang="en-IN" smtClean="0"/>
-              <a:t>02-12-2019</a:t>
+              <a:t>03-12-2019</a:t>
             </a:fld>
             <a:endParaRPr lang="en-IN"/>
           </a:p>
@@ -5198,172 +5197,64 @@
         </p:nvSpPr>
         <p:spPr/>
         <p:txBody>
-          <a:bodyPr>
-            <a:normAutofit/>
-          </a:bodyPr>
-          <a:lstStyle/>
-          <a:p>
-            <a:r>
-              <a:rPr lang="en-US" dirty="0"/>
-              <a:t> </a:t>
-            </a:r>
-            <a:r>
-              <a:rPr lang="en-US" dirty="0" smtClean="0"/>
-              <a:t>The</a:t>
-            </a:r>
-            <a:r>
-              <a:rPr lang="en-US" dirty="0"/>
-              <a:t> </a:t>
-            </a:r>
-            <a:r>
-              <a:rPr lang="en-US" b="1" dirty="0"/>
-              <a:t>singular value decomposition</a:t>
-            </a:r>
-            <a:r>
-              <a:rPr lang="en-US" dirty="0"/>
-              <a:t> (</a:t>
-            </a:r>
-            <a:r>
-              <a:rPr lang="en-US" b="1" dirty="0"/>
-              <a:t>SVD</a:t>
-            </a:r>
-            <a:r>
-              <a:rPr lang="en-US" dirty="0"/>
-              <a:t>) is a </a:t>
-            </a:r>
-            <a:r>
-              <a:rPr lang="en-US" dirty="0">
-                <a:hlinkClick r:id="rId2" tooltip="Matrix decomposition"/>
-              </a:rPr>
-              <a:t>factorization</a:t>
-            </a:r>
-            <a:r>
-              <a:rPr lang="en-US" dirty="0"/>
-              <a:t> of a </a:t>
-            </a:r>
-            <a:r>
-              <a:rPr lang="en-US" dirty="0">
-                <a:hlinkClick r:id="rId3" tooltip="Real number"/>
-              </a:rPr>
-              <a:t>real</a:t>
-            </a:r>
-            <a:r>
-              <a:rPr lang="en-US" dirty="0"/>
-              <a:t> or </a:t>
-            </a:r>
-            <a:r>
-              <a:rPr lang="en-US" dirty="0">
-                <a:hlinkClick r:id="rId4" tooltip="Complex number"/>
-              </a:rPr>
-              <a:t>complex</a:t>
-            </a:r>
-            <a:r>
-              <a:rPr lang="en-US" dirty="0"/>
-              <a:t> </a:t>
-            </a:r>
-            <a:r>
-              <a:rPr lang="en-US" dirty="0">
-                <a:hlinkClick r:id="rId5" tooltip="Matrix (mathematics)"/>
-              </a:rPr>
-              <a:t>matrix</a:t>
-            </a:r>
-            <a:r>
-              <a:rPr lang="en-US" dirty="0"/>
-              <a:t>. It is the generalization of the </a:t>
-            </a:r>
-            <a:r>
-              <a:rPr lang="en-US" dirty="0" err="1">
-                <a:hlinkClick r:id="rId6" tooltip="Eigendecomposition"/>
-              </a:rPr>
-              <a:t>eigendecomposition</a:t>
-            </a:r>
-            <a:r>
-              <a:rPr lang="en-US" dirty="0"/>
-              <a:t> of a </a:t>
-            </a:r>
-            <a:r>
-              <a:rPr lang="en-US" u="sng" dirty="0">
-                <a:hlinkClick r:id="rId7"/>
-              </a:rPr>
-              <a:t>normal </a:t>
-            </a:r>
-            <a:r>
-              <a:rPr lang="en-US" u="sng" dirty="0" smtClean="0">
-                <a:hlinkClick r:id="rId7"/>
-              </a:rPr>
-              <a:t>matrix</a:t>
-            </a:r>
-            <a:r>
-              <a:rPr lang="en-US" u="sng" dirty="0" smtClean="0"/>
-              <a:t>.</a:t>
-            </a:r>
-          </a:p>
-          <a:p>
-            <a:r>
-              <a:rPr lang="en-IN" dirty="0"/>
-              <a:t>the singular value decomposition of </a:t>
-            </a:r>
-            <a:r>
-              <a:rPr lang="en-IN" dirty="0" smtClean="0"/>
-              <a:t>an m x n</a:t>
-            </a:r>
-            <a:r>
-              <a:rPr lang="en-IN" dirty="0"/>
-              <a:t> real or complex </a:t>
-            </a:r>
-            <a:r>
-              <a:rPr lang="en-IN" dirty="0" smtClean="0"/>
-              <a:t>matrix M</a:t>
-            </a:r>
-            <a:r>
-              <a:rPr lang="en-IN" dirty="0"/>
-              <a:t> is a factorization of the form </a:t>
-            </a:r>
-            <a:r>
-              <a:rPr lang="en-IN" dirty="0" smtClean="0"/>
-              <a:t>U </a:t>
-            </a:r>
-            <a:r>
-              <a:rPr lang="en-US" dirty="0" smtClean="0"/>
-              <a:t>∑ </a:t>
-            </a:r>
-            <a:r>
-              <a:rPr lang="en-IN" dirty="0" smtClean="0"/>
-              <a:t>V</a:t>
-            </a:r>
-            <a:r>
-              <a:rPr lang="en-IN" baseline="30000" dirty="0" smtClean="0"/>
-              <a:t>T</a:t>
-            </a:r>
-            <a:r>
-              <a:rPr lang="en-IN" dirty="0" smtClean="0"/>
-              <a:t>.</a:t>
-            </a:r>
-            <a:r>
-              <a:rPr lang="en-IN" dirty="0"/>
-              <a:t> </a:t>
-            </a:r>
-          </a:p>
-        </p:txBody>
-      </p:sp>
-      <p:sp>
-        <p:nvSpPr>
-          <p:cNvPr id="3" name="Title 2"/>
-          <p:cNvSpPr>
-            <a:spLocks noGrp="1"/>
-          </p:cNvSpPr>
-          <p:nvPr>
-            <p:ph type="title"/>
-          </p:nvPr>
-        </p:nvSpPr>
-        <p:spPr/>
-        <p:txBody>
           <a:bodyPr/>
           <a:lstStyle/>
           <a:p>
             <a:r>
               <a:rPr lang="en-IN" dirty="0" smtClean="0"/>
-              <a:t>Singular Value Decomposition</a:t>
+              <a:t>Clustering algorithm based on distance similarities.</a:t>
+            </a:r>
+          </a:p>
+          <a:p>
+            <a:r>
+              <a:rPr lang="en-IN" dirty="0" smtClean="0"/>
+              <a:t>Aim: </a:t>
+            </a:r>
+          </a:p>
+          <a:p>
+            <a:pPr marL="624078" indent="-514350">
+              <a:buAutoNum type="arabicPeriod"/>
+            </a:pPr>
+            <a:r>
+              <a:rPr lang="en-IN" dirty="0" smtClean="0"/>
+              <a:t>Inter-cluster distance is maximum.</a:t>
+            </a:r>
+          </a:p>
+          <a:p>
+            <a:pPr marL="624078" indent="-514350">
+              <a:buAutoNum type="arabicPeriod"/>
+            </a:pPr>
+            <a:r>
+              <a:rPr lang="en-IN" dirty="0" smtClean="0"/>
+              <a:t>Intra-cluster distance is minimum.</a:t>
+            </a:r>
+          </a:p>
+          <a:p>
+            <a:pPr marL="109728" indent="0">
+              <a:buNone/>
+            </a:pPr>
+            <a:endParaRPr lang="en-IN" dirty="0" smtClean="0"/>
+          </a:p>
+        </p:txBody>
+      </p:sp>
+      <p:sp>
+        <p:nvSpPr>
+          <p:cNvPr id="3" name="Title 2"/>
+          <p:cNvSpPr>
+            <a:spLocks noGrp="1"/>
+          </p:cNvSpPr>
+          <p:nvPr>
+            <p:ph type="title"/>
+          </p:nvPr>
+        </p:nvSpPr>
+        <p:spPr/>
+        <p:txBody>
+          <a:bodyPr/>
+          <a:lstStyle/>
+          <a:p>
+            <a:r>
+              <a:rPr lang="en-IN" dirty="0" smtClean="0"/>
+              <a:t>K-means</a:t>
             </a:r>
             <a:endParaRPr lang="en-IN" dirty="0"/>
           </a:p>
@@ -5372,7 +5263,7 @@
     </p:spTree>
     <p:extLst>
       <p:ext uri="{BB962C8B-B14F-4D97-AF65-F5344CB8AC3E}">
-        <p14:creationId xmlns:p14="http://schemas.microsoft.com/office/powerpoint/2010/main" val="1309465086"/>
+        <p14:creationId xmlns:p14="http://schemas.microsoft.com/office/powerpoint/2010/main" val="2739607954"/>
       </p:ext>
     </p:extLst>
   </p:cSld>
@@ -5414,125 +5305,12 @@
           <a:bodyPr/>
           <a:lstStyle/>
           <a:p>
-            <a:r>
-              <a:rPr lang="en-IN" dirty="0" smtClean="0"/>
-              <a:t>Clustering algorithm based on distance similarities.</a:t>
-            </a:r>
-          </a:p>
-          <a:p>
-            <a:r>
-              <a:rPr lang="en-IN" dirty="0" smtClean="0"/>
-              <a:t>Aim: </a:t>
-            </a:r>
-          </a:p>
-          <a:p>
             <a:pPr marL="624078" indent="-514350">
               <a:buAutoNum type="arabicPeriod"/>
             </a:pPr>
             <a:r>
               <a:rPr lang="en-IN" dirty="0" smtClean="0"/>
-              <a:t>Inter-cluster distance is maximum.</a:t>
-            </a:r>
-          </a:p>
-          <a:p>
-            <a:pPr marL="624078" indent="-514350">
-              <a:buAutoNum type="arabicPeriod"/>
-            </a:pPr>
-            <a:r>
-              <a:rPr lang="en-IN" dirty="0" smtClean="0"/>
-              <a:t>Intra-cluster distance is minimum.</a:t>
-            </a:r>
-          </a:p>
-          <a:p>
-            <a:pPr marL="109728" indent="0">
-              <a:buNone/>
-            </a:pPr>
-            <a:endParaRPr lang="en-IN" dirty="0" smtClean="0"/>
-          </a:p>
-        </p:txBody>
-      </p:sp>
-      <p:sp>
-        <p:nvSpPr>
-          <p:cNvPr id="3" name="Title 2"/>
-          <p:cNvSpPr>
-            <a:spLocks noGrp="1"/>
-          </p:cNvSpPr>
-          <p:nvPr>
-            <p:ph type="title"/>
-          </p:nvPr>
-        </p:nvSpPr>
-        <p:spPr/>
-        <p:txBody>
-          <a:bodyPr/>
-          <a:lstStyle/>
-          <a:p>
-            <a:r>
-              <a:rPr lang="en-IN" dirty="0" smtClean="0"/>
-              <a:t>K-means</a:t>
-            </a:r>
-            <a:endParaRPr lang="en-IN" dirty="0"/>
-          </a:p>
-        </p:txBody>
-      </p:sp>
-    </p:spTree>
-    <p:extLst>
-      <p:ext uri="{BB962C8B-B14F-4D97-AF65-F5344CB8AC3E}">
-        <p14:creationId xmlns:p14="http://schemas.microsoft.com/office/powerpoint/2010/main" val="2739607954"/>
-      </p:ext>
-    </p:extLst>
-  </p:cSld>
-  <p:clrMapOvr>
-    <a:masterClrMapping/>
-  </p:clrMapOvr>
-</p:sld>
-</file>
-
-<file path=ppt/slides/slide12.xml><?xml version="1.0" encoding="utf-8"?>
-<p:sld xmlns:a="http://schemas.openxmlformats.org/drawingml/2006/main" xmlns:r="http://schemas.openxmlformats.org/officeDocument/2006/relationships" xmlns:p="http://schemas.openxmlformats.org/presentationml/2006/main">
-  <p:cSld>
-    <p:spTree>
-      <p:nvGrpSpPr>
-        <p:cNvPr id="1" name=""/>
-        <p:cNvGrpSpPr/>
-        <p:nvPr/>
-      </p:nvGrpSpPr>
-      <p:grpSpPr>
-        <a:xfrm>
-          <a:off x="0" y="0"/>
-          <a:ext cx="0" cy="0"/>
-          <a:chOff x="0" y="0"/>
-          <a:chExt cx="0" cy="0"/>
-        </a:xfrm>
-      </p:grpSpPr>
-      <p:sp>
-        <p:nvSpPr>
-          <p:cNvPr id="2" name="Content Placeholder 1"/>
-          <p:cNvSpPr>
-            <a:spLocks noGrp="1"/>
-          </p:cNvSpPr>
-          <p:nvPr>
-            <p:ph idx="1"/>
-          </p:nvPr>
-        </p:nvSpPr>
-        <p:spPr/>
-        <p:txBody>
-          <a:bodyPr/>
-          <a:lstStyle/>
-          <a:p>
-            <a:pPr marL="624078" indent="-514350">
-              <a:buAutoNum type="arabicPeriod"/>
-            </a:pPr>
-            <a:r>
-              <a:rPr lang="en-IN" dirty="0" smtClean="0"/>
-              <a:t>Adjusted </a:t>
-            </a:r>
-            <a:r>
-              <a:rPr lang="en-IN" dirty="0" smtClean="0"/>
-              <a:t>rand </a:t>
-            </a:r>
-            <a:r>
-              <a:rPr lang="en-IN" dirty="0" smtClean="0"/>
-              <a:t>index.</a:t>
+              <a:t>Adjusted rand index.</a:t>
             </a:r>
           </a:p>
           <a:p>
@@ -6474,58 +6252,63 @@
         <p:spPr/>
         <p:txBody>
           <a:bodyPr>
-            <a:normAutofit fontScale="85000" lnSpcReduction="10000"/>
+            <a:normAutofit/>
           </a:bodyPr>
           <a:lstStyle/>
           <a:p>
             <a:r>
               <a:rPr lang="en-US" dirty="0"/>
-              <a:t>In LDA, each document may be viewed as a </a:t>
-            </a:r>
-            <a:r>
-              <a:rPr lang="en-US" dirty="0">
-                <a:hlinkClick r:id="rId2" tooltip="Mixture model"/>
-              </a:rPr>
-              <a:t>mixture</a:t>
+              <a:t> </a:t>
+            </a:r>
+            <a:r>
+              <a:rPr lang="en-US" dirty="0" smtClean="0"/>
+              <a:t>The</a:t>
             </a:r>
             <a:r>
               <a:rPr lang="en-US" dirty="0"/>
-              <a:t> of various topics where each document is considered to have a set of topics that are assigned to it via LDA. </a:t>
-            </a:r>
-            <a:endParaRPr lang="en-US" dirty="0" smtClean="0"/>
-          </a:p>
-          <a:p>
-            <a:r>
-              <a:rPr lang="en-US" dirty="0" smtClean="0"/>
-              <a:t>This </a:t>
-            </a:r>
-            <a:r>
-              <a:rPr lang="en-US" dirty="0"/>
-              <a:t>is identical to </a:t>
-            </a:r>
-            <a:r>
-              <a:rPr lang="en-US" dirty="0">
-                <a:hlinkClick r:id="rId3" tooltip="PLSA"/>
-              </a:rPr>
-              <a:t>probabilistic latent semantic analysis</a:t>
+              <a:t> </a:t>
+            </a:r>
+            <a:r>
+              <a:rPr lang="en-US" b="1" dirty="0"/>
+              <a:t>singular value decomposition</a:t>
             </a:r>
             <a:r>
               <a:rPr lang="en-US" dirty="0"/>
               <a:t> (</a:t>
             </a:r>
             <a:r>
-              <a:rPr lang="en-US" dirty="0" err="1"/>
-              <a:t>pLSA</a:t>
+              <a:rPr lang="en-US" b="1" dirty="0"/>
+              <a:t>SVD</a:t>
             </a:r>
             <a:r>
               <a:rPr lang="en-US" dirty="0"/>
-              <a:t>), except that in LDA the topic distribution is assumed to have a sparse </a:t>
-            </a:r>
-            <a:r>
-              <a:rPr lang="en-US" dirty="0" err="1">
-                <a:hlinkClick r:id="rId4" tooltip="Dirichlet distribution"/>
+              <a:t>) is a </a:t>
+            </a:r>
+            <a:r>
+              <a:rPr lang="en-US" dirty="0">
+                <a:hlinkClick r:id="rId2" tooltip="Matrix decomposition"/>
               </a:rPr>
-              <a:t>Dirichlet</a:t>
+              <a:t>factorization</a:t>
+            </a:r>
+            <a:r>
+              <a:rPr lang="en-US" dirty="0"/>
+              <a:t> of a </a:t>
+            </a:r>
+            <a:r>
+              <a:rPr lang="en-US" dirty="0">
+                <a:hlinkClick r:id="rId3" tooltip="Real number"/>
+              </a:rPr>
+              <a:t>real</a:t>
+            </a:r>
+            <a:r>
+              <a:rPr lang="en-US" dirty="0"/>
+              <a:t> or </a:t>
+            </a:r>
+            <a:r>
+              <a:rPr lang="en-US" dirty="0">
+                <a:hlinkClick r:id="rId4" tooltip="Complex number"/>
+              </a:rPr>
+              <a:t>complex</a:t>
             </a:r>
             <a:r>
               <a:rPr lang="en-US" dirty="0"/>
@@ -6533,58 +6316,86 @@
             </a:r>
             <a:r>
               <a:rPr lang="en-US" dirty="0">
-                <a:hlinkClick r:id="rId5" tooltip="Prior probability"/>
+                <a:hlinkClick r:id="rId5" tooltip="Matrix (mathematics)"/>
               </a:rPr>
-              <a:t>prior</a:t>
+              <a:t>matrix</a:t>
             </a:r>
             <a:r>
               <a:rPr lang="en-US" dirty="0"/>
-              <a:t>. </a:t>
-            </a:r>
-            <a:endParaRPr lang="en-US" dirty="0" smtClean="0"/>
-          </a:p>
-          <a:p>
+              <a:t>. It is the generalization of the </a:t>
+            </a:r>
+            <a:r>
+              <a:rPr lang="en-US" dirty="0" err="1">
+                <a:hlinkClick r:id="rId6" tooltip="Eigendecomposition"/>
+              </a:rPr>
+              <a:t>eigendecomposition</a:t>
+            </a:r>
+            <a:r>
+              <a:rPr lang="en-US" dirty="0"/>
+              <a:t> of a </a:t>
+            </a:r>
+            <a:r>
+              <a:rPr lang="en-US" u="sng" dirty="0">
+                <a:hlinkClick r:id="rId7"/>
+              </a:rPr>
+              <a:t>normal </a:t>
+            </a:r>
+            <a:r>
+              <a:rPr lang="en-US" u="sng" dirty="0" smtClean="0">
+                <a:hlinkClick r:id="rId7"/>
+              </a:rPr>
+              <a:t>matrix</a:t>
+            </a:r>
+            <a:r>
+              <a:rPr lang="en-US" u="sng" dirty="0" smtClean="0"/>
+              <a:t>.</a:t>
+            </a:r>
+          </a:p>
+          <a:p>
+            <a:r>
+              <a:rPr lang="en-IN" dirty="0"/>
+              <a:t>the singular value decomposition of </a:t>
+            </a:r>
+            <a:r>
+              <a:rPr lang="en-IN" dirty="0" smtClean="0"/>
+              <a:t>an m x n</a:t>
+            </a:r>
+            <a:r>
+              <a:rPr lang="en-IN" dirty="0"/>
+              <a:t> real or complex </a:t>
+            </a:r>
+            <a:r>
+              <a:rPr lang="en-IN" dirty="0" smtClean="0"/>
+              <a:t>matrix M</a:t>
+            </a:r>
+            <a:r>
+              <a:rPr lang="en-IN" dirty="0"/>
+              <a:t> is a factorization of the form </a:t>
+            </a:r>
+            <a:r>
+              <a:rPr lang="en-IN" dirty="0" smtClean="0"/>
+              <a:t>U </a:t>
+            </a:r>
             <a:r>
               <a:rPr lang="en-US" dirty="0" smtClean="0"/>
-              <a:t>The </a:t>
-            </a:r>
-            <a:r>
-              <a:rPr lang="en-US" dirty="0"/>
-              <a:t>sparse </a:t>
-            </a:r>
-            <a:r>
-              <a:rPr lang="en-US" dirty="0" err="1"/>
-              <a:t>Dirichlet</a:t>
-            </a:r>
-            <a:r>
-              <a:rPr lang="en-US" dirty="0"/>
-              <a:t> priors encode the intuition that documents cover only a small set of topics and that topics use only a small set of words frequently. </a:t>
-            </a:r>
-          </a:p>
-          <a:p>
-            <a:r>
-              <a:rPr lang="en-US" dirty="0" smtClean="0"/>
-              <a:t>Python implementation:</a:t>
-            </a:r>
-          </a:p>
-          <a:p>
-            <a:pPr marL="109728" indent="0">
-              <a:buNone/>
-            </a:pPr>
-            <a:r>
-              <a:rPr lang="en-IN" b="1" dirty="0" err="1" smtClean="0">
-                <a:hlinkClick r:id="rId6" tooltip="sklearn.decomposition"/>
-              </a:rPr>
-              <a:t>sklearn.decomposition</a:t>
-            </a:r>
-            <a:r>
-              <a:rPr lang="en-IN" b="1" dirty="0" err="1" smtClean="0"/>
-              <a:t>.LatentDirichletAllocation</a:t>
-            </a:r>
-            <a:endParaRPr lang="en-IN" b="1" dirty="0"/>
-          </a:p>
-          <a:p>
-            <a:endParaRPr lang="en-US" dirty="0" smtClean="0"/>
+              <a:t>∑ </a:t>
+            </a:r>
+            <a:r>
+              <a:rPr lang="en-IN" dirty="0" smtClean="0"/>
+              <a:t>V</a:t>
+            </a:r>
+            <a:r>
+              <a:rPr lang="en-IN" baseline="30000" dirty="0" smtClean="0"/>
+              <a:t>T</a:t>
+            </a:r>
+            <a:r>
+              <a:rPr lang="en-IN" dirty="0" smtClean="0"/>
+              <a:t>.</a:t>
+            </a:r>
+            <a:r>
+              <a:rPr lang="en-IN" dirty="0"/>
+              <a:t> </a:t>
+            </a:r>
           </a:p>
         </p:txBody>
       </p:sp>
@@ -6605,15 +6416,7 @@
           <a:p>
             <a:r>
               <a:rPr lang="en-IN" dirty="0" smtClean="0"/>
-              <a:t>Latent </a:t>
-            </a:r>
-            <a:r>
-              <a:rPr lang="en-IN" dirty="0" err="1" smtClean="0"/>
-              <a:t>Dirichlet</a:t>
-            </a:r>
-            <a:r>
-              <a:rPr lang="en-IN" dirty="0" smtClean="0"/>
-              <a:t> Allocation</a:t>
+              <a:t>Singular Value Decomposition</a:t>
             </a:r>
             <a:endParaRPr lang="en-IN" dirty="0"/>
           </a:p>
@@ -6622,7 +6425,7 @@
     </p:spTree>
     <p:extLst>
       <p:ext uri="{BB962C8B-B14F-4D97-AF65-F5344CB8AC3E}">
-        <p14:creationId xmlns:p14="http://schemas.microsoft.com/office/powerpoint/2010/main" val="3485864347"/>
+        <p14:creationId xmlns:p14="http://schemas.microsoft.com/office/powerpoint/2010/main" val="1309465086"/>
       </p:ext>
     </p:extLst>
   </p:cSld>

</xml_diff>